<commit_message>
Final Presentation and code
</commit_message>
<xml_diff>
--- a/final_code/final presentation.pptx
+++ b/final_code/final presentation.pptx
@@ -112,6 +112,11 @@
       </a:defRPr>
     </a:lvl9pPr>
   </p:defaultTextStyle>
+  <p:extLst>
+    <p:ext uri="{EFAFB233-063F-42B5-8137-9DF3F51BA10A}">
+      <p15:sldGuideLst xmlns:p15="http://schemas.microsoft.com/office/powerpoint/2012/main"/>
+    </p:ext>
+  </p:extLst>
 </p:presentation>
 </file>
 
@@ -3449,9 +3454,11 @@
           <a:bodyPr/>
           <a:lstStyle/>
           <a:p>
-            <a:pPr algn="ctr"/>
-            <a:r>
-              <a:rPr lang="en-US" dirty="0"/>
+            <a:pPr algn="just"/>
+            <a:r>
+              <a:rPr lang="en-US" dirty="0">
+                <a:latin typeface="+mn-lt"/>
+              </a:rPr>
               <a:t>Preprocessing</a:t>
             </a:r>
           </a:p>
@@ -3478,7 +3485,7 @@
           <a:bodyPr/>
           <a:lstStyle/>
           <a:p>
-            <a:pPr marL="514350" indent="-514350">
+            <a:pPr marL="514350" indent="-514350" algn="just">
               <a:buAutoNum type="arabicPeriod"/>
             </a:pPr>
             <a:r>
@@ -3487,7 +3494,7 @@
             </a:r>
           </a:p>
           <a:p>
-            <a:pPr marL="514350" indent="-514350">
+            <a:pPr marL="514350" indent="-514350" algn="just">
               <a:buAutoNum type="arabicPeriod"/>
             </a:pPr>
             <a:r>
@@ -3496,7 +3503,7 @@
             </a:r>
           </a:p>
           <a:p>
-            <a:pPr marL="514350" indent="-514350">
+            <a:pPr marL="514350" indent="-514350" algn="just">
               <a:buAutoNum type="arabicPeriod"/>
             </a:pPr>
             <a:r>
@@ -3505,7 +3512,7 @@
             </a:r>
           </a:p>
           <a:p>
-            <a:pPr marL="514350" indent="-514350">
+            <a:pPr marL="514350" indent="-514350" algn="just">
               <a:buAutoNum type="arabicPeriod"/>
             </a:pPr>
             <a:r>
@@ -3514,7 +3521,7 @@
             </a:r>
           </a:p>
           <a:p>
-            <a:pPr marL="514350" indent="-514350">
+            <a:pPr marL="514350" indent="-514350" algn="just">
               <a:buAutoNum type="arabicPeriod"/>
             </a:pPr>
             <a:r>
@@ -3523,7 +3530,7 @@
             </a:r>
           </a:p>
           <a:p>
-            <a:pPr marL="0" indent="0">
+            <a:pPr marL="0" indent="0" algn="just">
               <a:buNone/>
             </a:pPr>
             <a:r>
@@ -3532,7 +3539,7 @@
             </a:r>
           </a:p>
           <a:p>
-            <a:pPr marL="0" indent="0">
+            <a:pPr marL="0" indent="0" algn="just">
               <a:buNone/>
             </a:pPr>
             <a:r>
@@ -3601,7 +3608,6 @@
           <a:bodyPr/>
           <a:lstStyle/>
           <a:p>
-            <a:pPr algn="ctr"/>
             <a:r>
               <a:rPr lang="en-US" dirty="0"/>
               <a:t>Feature Engineering</a:t>
@@ -3639,7 +3645,7 @@
           <a:p>
             <a:r>
               <a:rPr lang="en-US" dirty="0"/>
-              <a:t>There were 4 data features which were irrelevant and creating more bias due to a few skewed data or few unscaled data points.</a:t>
+              <a:t>There were 4 data features which were irrelevant and creating more bias on the basis of statistical tests and p-value evaluations.</a:t>
             </a:r>
           </a:p>
           <a:p>
@@ -3665,15 +3671,7 @@
             </a:pPr>
             <a:r>
               <a:rPr lang="en-US" dirty="0"/>
-              <a:t>              &gt;   Constant price index (</a:t>
-            </a:r>
-            <a:r>
-              <a:rPr lang="en-US" dirty="0" err="1"/>
-              <a:t>cons_price_idx</a:t>
-            </a:r>
-            <a:r>
-              <a:rPr lang="en-US" dirty="0"/>
-              <a:t>)</a:t>
+              <a:t>              &gt;   House Loan</a:t>
             </a:r>
           </a:p>
           <a:p>
@@ -3691,24 +3689,7 @@
             </a:pPr>
             <a:r>
               <a:rPr lang="en-US" dirty="0"/>
-              <a:t>              &gt;   Constant confidence index (</a:t>
-            </a:r>
-            <a:r>
-              <a:rPr lang="en-US" dirty="0" err="1"/>
-              <a:t>con_confi_idx</a:t>
-            </a:r>
-            <a:r>
-              <a:rPr lang="en-US" dirty="0"/>
-              <a:t>)</a:t>
-            </a:r>
-          </a:p>
-          <a:p>
-            <a:pPr marL="0" indent="0">
-              <a:buNone/>
-            </a:pPr>
-            <a:r>
-              <a:rPr lang="en-US" dirty="0"/>
-              <a:t>  </a:t>
+              <a:t>              &gt;   Personal Loan</a:t>
             </a:r>
           </a:p>
           <a:p>
@@ -3815,9 +3796,11 @@
           <a:bodyPr/>
           <a:lstStyle/>
           <a:p>
-            <a:pPr algn="ctr"/>
-            <a:r>
-              <a:rPr lang="en-US" dirty="0"/>
+            <a:pPr algn="just"/>
+            <a:r>
+              <a:rPr lang="en-US" dirty="0">
+                <a:latin typeface="+mn-lt"/>
+              </a:rPr>
               <a:t>Model Evaluation Matrix</a:t>
             </a:r>
           </a:p>
@@ -3844,7 +3827,7 @@
           <a:bodyPr/>
           <a:lstStyle/>
           <a:p>
-            <a:pPr marL="0" indent="0">
+            <a:pPr marL="0" indent="0" algn="just">
               <a:buNone/>
             </a:pPr>
             <a:r>
@@ -3853,13 +3836,13 @@
             </a:r>
           </a:p>
           <a:p>
-            <a:pPr marL="0" indent="0">
+            <a:pPr marL="0" indent="0" algn="just">
               <a:buNone/>
             </a:pPr>
             <a:endParaRPr lang="en-US" dirty="0"/>
           </a:p>
           <a:p>
-            <a:pPr marL="0" indent="0">
+            <a:pPr marL="0" indent="0" algn="just">
               <a:buNone/>
             </a:pPr>
             <a:r>
@@ -3868,18 +3851,18 @@
             </a:r>
           </a:p>
           <a:p>
-            <a:pPr marL="0" indent="0">
+            <a:pPr marL="0" indent="0" algn="just">
               <a:buNone/>
             </a:pPr>
             <a:endParaRPr lang="en-US" dirty="0"/>
           </a:p>
           <a:p>
-            <a:pPr marL="0" indent="0">
+            <a:pPr marL="0" indent="0" algn="just">
               <a:buNone/>
             </a:pPr>
             <a:r>
               <a:rPr lang="en-US" dirty="0"/>
-              <a:t>It can be fulfilled by improving recall score and also accuracy must be stable which can help us maintain the prediction quality.</a:t>
+              <a:t>It can be fulfilled by improving recall score and accuracy must be stable which can help us maintain the prediction quality.</a:t>
             </a:r>
           </a:p>
         </p:txBody>
@@ -4137,7 +4120,7 @@
           </a:bodyPr>
           <a:lstStyle/>
           <a:p>
-            <a:pPr marL="0" indent="0">
+            <a:pPr marL="0" indent="0" algn="just">
               <a:buNone/>
             </a:pPr>
             <a:r>
@@ -4236,7 +4219,7 @@
             </a:r>
           </a:p>
           <a:p>
-            <a:pPr marL="0" indent="0">
+            <a:pPr marL="0" indent="0" algn="just">
               <a:buNone/>
             </a:pPr>
             <a:endParaRPr lang="en-US" dirty="0"/>
@@ -4331,8 +4314,11 @@
           </a:bodyPr>
           <a:lstStyle/>
           <a:p>
-            <a:r>
-              <a:rPr lang="en-US" dirty="0"/>
+            <a:pPr algn="just"/>
+            <a:r>
+              <a:rPr lang="en-US" dirty="0">
+                <a:latin typeface="+mn-lt"/>
+              </a:rPr>
               <a:t>Model 2: Ensemble Method </a:t>
             </a:r>
           </a:p>
@@ -4366,7 +4352,7 @@
           </a:bodyPr>
           <a:lstStyle/>
           <a:p>
-            <a:pPr marL="0" indent="0">
+            <a:pPr marL="0" indent="0" algn="just">
               <a:buNone/>
             </a:pPr>
             <a:r>
@@ -4375,7 +4361,7 @@
             </a:r>
           </a:p>
           <a:p>
-            <a:pPr marL="0" indent="0">
+            <a:pPr marL="0" indent="0" algn="just">
               <a:buNone/>
             </a:pPr>
             <a:r>
@@ -4388,19 +4374,19 @@
             </a:r>
           </a:p>
           <a:p>
-            <a:pPr marL="0" indent="0">
+            <a:pPr marL="0" indent="0" algn="just">
               <a:buNone/>
             </a:pPr>
             <a:endParaRPr lang="en-US" sz="2000" dirty="0"/>
           </a:p>
           <a:p>
-            <a:pPr marL="0" indent="0">
+            <a:pPr marL="0" indent="0" algn="just">
               <a:buNone/>
             </a:pPr>
             <a:endParaRPr lang="en-US" sz="2000" dirty="0"/>
           </a:p>
           <a:p>
-            <a:pPr marL="0" indent="0">
+            <a:pPr marL="0" indent="0" algn="just">
               <a:buNone/>
             </a:pPr>
             <a:r>
@@ -4409,7 +4395,7 @@
             </a:r>
           </a:p>
           <a:p>
-            <a:pPr marL="0" indent="0">
+            <a:pPr marL="0" indent="0" algn="just">
               <a:buNone/>
             </a:pPr>
             <a:r>
@@ -4418,7 +4404,7 @@
             </a:r>
           </a:p>
           <a:p>
-            <a:pPr marL="0" indent="0">
+            <a:pPr marL="0" indent="0" algn="just">
               <a:buNone/>
             </a:pPr>
             <a:r>
@@ -4427,25 +4413,25 @@
             </a:r>
           </a:p>
           <a:p>
-            <a:pPr marL="0" indent="0">
+            <a:pPr marL="0" indent="0" algn="just">
               <a:buNone/>
             </a:pPr>
             <a:endParaRPr lang="en-US" sz="2000" b="1" dirty="0"/>
           </a:p>
           <a:p>
-            <a:pPr marL="0" indent="0">
+            <a:pPr marL="0" indent="0" algn="just">
               <a:buNone/>
             </a:pPr>
             <a:endParaRPr lang="en-US" sz="2000" b="1" dirty="0"/>
           </a:p>
           <a:p>
-            <a:pPr marL="0" indent="0">
+            <a:pPr marL="0" indent="0" algn="just">
               <a:buNone/>
             </a:pPr>
             <a:endParaRPr lang="en-US" sz="2000" b="1" dirty="0"/>
           </a:p>
           <a:p>
-            <a:pPr marL="0" indent="0">
+            <a:pPr marL="0" indent="0" algn="just">
               <a:buNone/>
             </a:pPr>
             <a:r>
@@ -4454,7 +4440,7 @@
             </a:r>
           </a:p>
           <a:p>
-            <a:pPr marL="0" indent="0">
+            <a:pPr marL="0" indent="0" algn="just">
               <a:buNone/>
             </a:pPr>
             <a:r>
@@ -4463,7 +4449,7 @@
             </a:r>
           </a:p>
           <a:p>
-            <a:pPr marL="0" indent="0">
+            <a:pPr marL="0" indent="0" algn="just">
               <a:buNone/>
             </a:pPr>
             <a:r>
@@ -4472,7 +4458,7 @@
             </a:r>
           </a:p>
           <a:p>
-            <a:pPr marL="0" indent="0">
+            <a:pPr marL="0" indent="0" algn="just">
               <a:buNone/>
             </a:pPr>
             <a:r>
@@ -4481,7 +4467,7 @@
             </a:r>
           </a:p>
           <a:p>
-            <a:pPr marL="0" indent="0">
+            <a:pPr marL="0" indent="0" algn="just">
               <a:buNone/>
             </a:pPr>
             <a:endParaRPr lang="en-US" sz="2000" b="1" dirty="0"/>
@@ -4599,8 +4585,11 @@
           <a:bodyPr/>
           <a:lstStyle/>
           <a:p>
-            <a:r>
-              <a:rPr lang="en-US" dirty="0"/>
+            <a:pPr algn="just"/>
+            <a:r>
+              <a:rPr lang="en-US" dirty="0">
+                <a:latin typeface="+mn-lt"/>
+              </a:rPr>
               <a:t>Model 3:  Boosting Method</a:t>
             </a:r>
           </a:p>
@@ -4629,7 +4618,7 @@
           </a:bodyPr>
           <a:lstStyle/>
           <a:p>
-            <a:pPr marL="0" indent="0">
+            <a:pPr marL="0" indent="0" algn="just">
               <a:buNone/>
             </a:pPr>
             <a:r>
@@ -4638,7 +4627,7 @@
             </a:r>
           </a:p>
           <a:p>
-            <a:pPr marL="0" indent="0">
+            <a:pPr marL="0" indent="0" algn="just">
               <a:buNone/>
             </a:pPr>
             <a:r>
@@ -4647,7 +4636,7 @@
             </a:r>
           </a:p>
           <a:p>
-            <a:pPr marL="0" indent="0">
+            <a:pPr marL="0" indent="0" algn="just">
               <a:buNone/>
             </a:pPr>
             <a:r>
@@ -4656,25 +4645,25 @@
             </a:r>
           </a:p>
           <a:p>
-            <a:pPr marL="0" indent="0">
+            <a:pPr marL="0" indent="0" algn="just">
               <a:buNone/>
             </a:pPr>
             <a:endParaRPr lang="en-US" dirty="0"/>
           </a:p>
           <a:p>
-            <a:pPr marL="0" indent="0">
+            <a:pPr marL="0" indent="0" algn="just">
               <a:buNone/>
             </a:pPr>
             <a:endParaRPr lang="en-US" dirty="0"/>
           </a:p>
           <a:p>
-            <a:pPr marL="0" indent="0">
+            <a:pPr marL="0" indent="0" algn="just">
               <a:buNone/>
             </a:pPr>
             <a:endParaRPr lang="en-US" dirty="0"/>
           </a:p>
           <a:p>
-            <a:pPr marL="0" indent="0">
+            <a:pPr marL="0" indent="0" algn="just">
               <a:buNone/>
             </a:pPr>
             <a:r>
@@ -4683,7 +4672,7 @@
             </a:r>
           </a:p>
           <a:p>
-            <a:pPr marL="0" indent="0">
+            <a:pPr marL="0" indent="0" algn="just">
               <a:buNone/>
             </a:pPr>
             <a:r>
@@ -4692,7 +4681,7 @@
             </a:r>
           </a:p>
           <a:p>
-            <a:pPr marL="0" indent="0">
+            <a:pPr marL="0" indent="0" algn="just">
               <a:buNone/>
             </a:pPr>
             <a:endParaRPr lang="en-US" dirty="0"/>
@@ -4721,8 +4710,8 @@
         </p:blipFill>
         <p:spPr>
           <a:xfrm>
-            <a:off x="2209799" y="3229769"/>
-            <a:ext cx="8391525" cy="771525"/>
+            <a:off x="2209799" y="2984658"/>
+            <a:ext cx="8391525" cy="888683"/>
           </a:xfrm>
           <a:prstGeom prst="rect">
             <a:avLst/>
@@ -4775,7 +4764,12 @@
             <p:ph type="title"/>
           </p:nvPr>
         </p:nvSpPr>
-        <p:spPr/>
+        <p:spPr>
+          <a:xfrm>
+            <a:off x="679704" y="161861"/>
+            <a:ext cx="10515600" cy="1325563"/>
+          </a:xfrm>
+        </p:spPr>
         <p:txBody>
           <a:bodyPr/>
           <a:lstStyle/>
@@ -4806,54 +4800,97 @@
         </p:nvSpPr>
         <p:spPr>
           <a:xfrm>
-            <a:off x="838200" y="1825625"/>
-            <a:ext cx="10515600" cy="3746500"/>
+            <a:off x="402336" y="1194816"/>
+            <a:ext cx="11277600" cy="5157216"/>
           </a:xfrm>
         </p:spPr>
         <p:txBody>
           <a:bodyPr>
-            <a:normAutofit fontScale="85000" lnSpcReduction="10000"/>
+            <a:noAutofit/>
           </a:bodyPr>
           <a:lstStyle/>
           <a:p>
-            <a:r>
-              <a:rPr lang="en-US" dirty="0"/>
-              <a:t>The Ensemble Technique has varied accuracy with different </a:t>
-            </a:r>
-            <a:r>
-              <a:rPr lang="en-US" dirty="0" err="1"/>
-              <a:t>tehniques</a:t>
-            </a:r>
-            <a:r>
-              <a:rPr lang="en-US" dirty="0"/>
-              <a:t> applied on the predicting the target variable, but recall remain the constant.</a:t>
-            </a:r>
-          </a:p>
-          <a:p>
-            <a:endParaRPr lang="en-US" dirty="0"/>
-          </a:p>
-          <a:p>
-            <a:r>
-              <a:rPr lang="en-US" dirty="0"/>
+            <a:pPr algn="just"/>
+            <a:r>
+              <a:rPr lang="en-US" sz="2000" dirty="0"/>
+              <a:t>The Ensemble Technique has varied accuracy with different techniques applied on the predicting the target variable, but recall remain the constant.</a:t>
+            </a:r>
+          </a:p>
+          <a:p>
+            <a:pPr algn="just"/>
+            <a:endParaRPr lang="en-US" sz="2000" dirty="0"/>
+          </a:p>
+          <a:p>
+            <a:pPr algn="just"/>
+            <a:r>
+              <a:rPr lang="en-US" sz="2000" dirty="0"/>
               <a:t>The Linear Model improved with different techniques and helped the model to predict falser positive to increase the chance of campaigning for more reliable subscriber, but accuracy was being very low.</a:t>
             </a:r>
           </a:p>
           <a:p>
-            <a:endParaRPr lang="en-US" dirty="0"/>
-          </a:p>
-          <a:p>
-            <a:r>
-              <a:rPr lang="en-US" dirty="0"/>
+            <a:pPr algn="just"/>
+            <a:endParaRPr lang="en-US" sz="2000" dirty="0"/>
+          </a:p>
+          <a:p>
+            <a:pPr algn="just"/>
+            <a:r>
+              <a:rPr lang="en-US" sz="2000" dirty="0"/>
               <a:t>However, Boosting technique had overall high accuracy and high recall which had made more varied to the business goal and can predict the </a:t>
             </a:r>
           </a:p>
           <a:p>
-            <a:pPr marL="0" indent="0">
-              <a:buNone/>
-            </a:pPr>
-            <a:r>
-              <a:rPr lang="en-US" b="1" dirty="0"/>
-              <a:t>Total number of must be contact = True Positive + False Positive </a:t>
+            <a:pPr marL="0" indent="0" algn="just">
+              <a:buNone/>
+            </a:pPr>
+            <a:endParaRPr lang="en-US" sz="2000" dirty="0"/>
+          </a:p>
+          <a:p>
+            <a:pPr marL="0" indent="0" algn="just">
+              <a:buNone/>
+            </a:pPr>
+            <a:r>
+              <a:rPr lang="en-US" sz="2000" b="1" dirty="0">
+                <a:highlight>
+                  <a:srgbClr val="FFFF00"/>
+                </a:highlight>
+              </a:rPr>
+              <a:t>Conclusion 1 </a:t>
+            </a:r>
+            <a:r>
+              <a:rPr lang="en-US" sz="2000" b="1" dirty="0"/>
+              <a:t>: Total number of people must be contacted = True Positive + False Positive(If we are focusing on contacting people who were contacted before).</a:t>
+            </a:r>
+          </a:p>
+          <a:p>
+            <a:pPr marL="0" indent="0" algn="just">
+              <a:buNone/>
+            </a:pPr>
+            <a:endParaRPr lang="en-US" sz="2000" b="1" dirty="0"/>
+          </a:p>
+          <a:p>
+            <a:pPr marL="0" indent="0" algn="just">
+              <a:buNone/>
+            </a:pPr>
+            <a:r>
+              <a:rPr lang="en-US" sz="2000" b="1" dirty="0">
+                <a:highlight>
+                  <a:srgbClr val="FFFF00"/>
+                </a:highlight>
+              </a:rPr>
+              <a:t>Conclusion 2</a:t>
+            </a:r>
+            <a:r>
+              <a:rPr lang="en-US" sz="2000" b="1" dirty="0"/>
+              <a:t>: Also, It allow us to predict whether the new customer will accept </a:t>
+            </a:r>
+          </a:p>
+          <a:p>
+            <a:pPr marL="0" indent="0" algn="just">
+              <a:buNone/>
+            </a:pPr>
+            <a:r>
+              <a:rPr lang="en-US" sz="2000" b="1" dirty="0"/>
+              <a:t>the product or not!    </a:t>
             </a:r>
           </a:p>
         </p:txBody>

</xml_diff>